<commit_message>
Pipe database had small formatting changes.  The ppt had final changes made to the BW design.  SRSF just needs the BW drain channel designed.
git-svn-id: https://forge.cornell.edu/svn/repos/automated_design@3500 d22a8b0d-b447-0410-a14f-ca4c0a428a39
</commit_message>
<xml_diff>
--- a/Final Designs/SRSF Layout.pptx
+++ b/Final Designs/SRSF Layout.pptx
@@ -3968,7 +3968,6 @@
               <a:rPr lang="en-US" smtClean="0"/>
               <a:t>Click to edit Master title style</a:t>
             </a:r>
-            <a:endParaRPr lang="en-US" smtClean="0"/>
           </a:p>
         </p:txBody>
       </p:sp>
@@ -4040,7 +4039,6 @@
               <a:rPr lang="en-US" smtClean="0"/>
               <a:t>Fifth level</a:t>
             </a:r>
-            <a:endParaRPr lang="en-US" smtClean="0"/>
           </a:p>
         </p:txBody>
       </p:sp>
@@ -14810,8 +14808,8 @@
         </p:nvSpPr>
         <p:spPr bwMode="auto">
           <a:xfrm>
-            <a:off x="5255046" y="4825388"/>
-            <a:ext cx="2115237" cy="297455"/>
+            <a:off x="4953740" y="4825388"/>
+            <a:ext cx="2416543" cy="297455"/>
           </a:xfrm>
           <a:prstGeom prst="rect">
             <a:avLst/>
@@ -16765,8 +16763,8 @@
         </p:nvSpPr>
         <p:spPr bwMode="auto">
           <a:xfrm>
-            <a:off x="4618652" y="4828350"/>
-            <a:ext cx="182689" cy="178843"/>
+            <a:off x="4627530" y="4881617"/>
+            <a:ext cx="139779" cy="116512"/>
           </a:xfrm>
           <a:prstGeom prst="ellipse">
             <a:avLst/>
@@ -16832,8 +16830,8 @@
         </p:nvCxnSpPr>
         <p:spPr bwMode="auto">
           <a:xfrm rot="5400000">
-            <a:off x="4445583" y="4519662"/>
-            <a:ext cx="573102" cy="44274"/>
+            <a:off x="4412662" y="4540007"/>
+            <a:ext cx="626369" cy="56851"/>
           </a:xfrm>
           <a:prstGeom prst="straightConnector1">
             <a:avLst/>
@@ -16853,24 +16851,86 @@
       </p:cxnSp>
       <p:sp>
         <p:nvSpPr>
-          <p:cNvPr id="108" name="Trapezoid 107"/>
+          <p:cNvPr id="68" name="Rectangle 67"/>
           <p:cNvSpPr/>
           <p:nvPr/>
         </p:nvSpPr>
         <p:spPr bwMode="auto">
-          <a:xfrm rot="5400000">
-            <a:off x="4560980" y="4836405"/>
-            <a:ext cx="1079655" cy="286441"/>
-          </a:xfrm>
-          <a:prstGeom prst="trapezoid">
-            <a:avLst>
-              <a:gd name="adj" fmla="val 141154"/>
-            </a:avLst>
+          <a:xfrm>
+            <a:off x="4955220" y="4403323"/>
+            <a:ext cx="318116" cy="1100831"/>
+          </a:xfrm>
+          <a:prstGeom prst="rect">
+            <a:avLst/>
           </a:prstGeom>
           <a:noFill/>
           <a:ln w="12700" cap="flat" cmpd="sng" algn="ctr">
             <a:solidFill>
-              <a:srgbClr val="FF0000"/>
+              <a:schemeClr val="accent1"/>
+            </a:solidFill>
+            <a:prstDash val="solid"/>
+            <a:round/>
+            <a:headEnd type="none" w="lg" len="med"/>
+            <a:tailEnd type="none" w="lg" len="med"/>
+          </a:ln>
+          <a:effectLst/>
+        </p:spPr>
+        <p:txBody>
+          <a:bodyPr vert="horz" wrap="square" lIns="91440" tIns="45720" rIns="91440" bIns="45720" numCol="1" rtlCol="0" anchor="t" anchorCtr="0" compatLnSpc="1">
+            <a:prstTxWarp prst="textNoShape">
+              <a:avLst/>
+            </a:prstTxWarp>
+            <a:noAutofit/>
+          </a:bodyPr>
+          <a:lstStyle/>
+          <a:p>
+            <a:pPr marL="0" marR="0" indent="0" algn="l" defTabSz="914400" rtl="0" eaLnBrk="0" fontAlgn="base" latinLnBrk="0" hangingPunct="0">
+              <a:lnSpc>
+                <a:spcPct val="100000"/>
+              </a:lnSpc>
+              <a:spcBef>
+                <a:spcPct val="50000"/>
+              </a:spcBef>
+              <a:spcAft>
+                <a:spcPct val="0"/>
+              </a:spcAft>
+              <a:buClrTx/>
+              <a:buSzTx/>
+              <a:buFontTx/>
+              <a:buNone/>
+              <a:tabLst/>
+            </a:pPr>
+            <a:endParaRPr kumimoji="0" lang="en-US" sz="2800" b="0" i="0" u="none" strike="noStrike" cap="none" normalizeH="0" baseline="0" smtClean="0">
+              <a:ln>
+                <a:noFill/>
+              </a:ln>
+              <a:solidFill>
+                <a:schemeClr val="tx1"/>
+              </a:solidFill>
+              <a:effectLst/>
+              <a:latin typeface="Times New Roman" pitchFamily="18" charset="0"/>
+            </a:endParaRPr>
+          </a:p>
+        </p:txBody>
+      </p:sp>
+      <p:sp>
+        <p:nvSpPr>
+          <p:cNvPr id="75" name="Oval 74"/>
+          <p:cNvSpPr/>
+          <p:nvPr/>
+        </p:nvSpPr>
+        <p:spPr bwMode="auto">
+          <a:xfrm flipV="1">
+            <a:off x="4985557" y="4834434"/>
+            <a:ext cx="265296" cy="259711"/>
+          </a:xfrm>
+          <a:prstGeom prst="ellipse">
+            <a:avLst/>
+          </a:prstGeom>
+          <a:noFill/>
+          <a:ln w="12700" cap="flat" cmpd="sng" algn="ctr">
+            <a:solidFill>
+              <a:srgbClr val="92D050"/>
             </a:solidFill>
             <a:prstDash val="solid"/>
             <a:round/>

</xml_diff>